<commit_message>
add more details about checkpoint
</commit_message>
<xml_diff>
--- a/Spark_checkpoint.pptx
+++ b/Spark_checkpoint.pptx
@@ -223,7 +223,7 @@
           <a:p>
             <a:fld id="{6FE37721-1188-47D5-9044-022ECE8C9E54}" type="datetimeFigureOut">
               <a:rPr lang="ru-RU" smtClean="0"/>
-              <a:t>21.02.2021</a:t>
+              <a:t>28.02.2021</a:t>
             </a:fld>
             <a:endParaRPr lang="ru-RU"/>
           </a:p>
@@ -706,7 +706,7 @@
           <a:p>
             <a:fld id="{B7A4174B-3865-4C52-8BB2-B1080AE4813B}" type="datetimeFigureOut">
               <a:rPr lang="ru-RU" smtClean="0"/>
-              <a:t>21.02.2021</a:t>
+              <a:t>28.02.2021</a:t>
             </a:fld>
             <a:endParaRPr lang="ru-RU"/>
           </a:p>
@@ -876,7 +876,7 @@
           <a:p>
             <a:fld id="{B7A4174B-3865-4C52-8BB2-B1080AE4813B}" type="datetimeFigureOut">
               <a:rPr lang="ru-RU" smtClean="0"/>
-              <a:t>21.02.2021</a:t>
+              <a:t>28.02.2021</a:t>
             </a:fld>
             <a:endParaRPr lang="ru-RU"/>
           </a:p>
@@ -1056,7 +1056,7 @@
           <a:p>
             <a:fld id="{B7A4174B-3865-4C52-8BB2-B1080AE4813B}" type="datetimeFigureOut">
               <a:rPr lang="ru-RU" smtClean="0"/>
-              <a:t>21.02.2021</a:t>
+              <a:t>28.02.2021</a:t>
             </a:fld>
             <a:endParaRPr lang="ru-RU"/>
           </a:p>
@@ -1226,7 +1226,7 @@
           <a:p>
             <a:fld id="{B7A4174B-3865-4C52-8BB2-B1080AE4813B}" type="datetimeFigureOut">
               <a:rPr lang="ru-RU" smtClean="0"/>
-              <a:t>21.02.2021</a:t>
+              <a:t>28.02.2021</a:t>
             </a:fld>
             <a:endParaRPr lang="ru-RU"/>
           </a:p>
@@ -1472,7 +1472,7 @@
           <a:p>
             <a:fld id="{B7A4174B-3865-4C52-8BB2-B1080AE4813B}" type="datetimeFigureOut">
               <a:rPr lang="ru-RU" smtClean="0"/>
-              <a:t>21.02.2021</a:t>
+              <a:t>28.02.2021</a:t>
             </a:fld>
             <a:endParaRPr lang="ru-RU"/>
           </a:p>
@@ -1704,7 +1704,7 @@
           <a:p>
             <a:fld id="{B7A4174B-3865-4C52-8BB2-B1080AE4813B}" type="datetimeFigureOut">
               <a:rPr lang="ru-RU" smtClean="0"/>
-              <a:t>21.02.2021</a:t>
+              <a:t>28.02.2021</a:t>
             </a:fld>
             <a:endParaRPr lang="ru-RU"/>
           </a:p>
@@ -2071,7 +2071,7 @@
           <a:p>
             <a:fld id="{B7A4174B-3865-4C52-8BB2-B1080AE4813B}" type="datetimeFigureOut">
               <a:rPr lang="ru-RU" smtClean="0"/>
-              <a:t>21.02.2021</a:t>
+              <a:t>28.02.2021</a:t>
             </a:fld>
             <a:endParaRPr lang="ru-RU"/>
           </a:p>
@@ -2189,7 +2189,7 @@
           <a:p>
             <a:fld id="{B7A4174B-3865-4C52-8BB2-B1080AE4813B}" type="datetimeFigureOut">
               <a:rPr lang="ru-RU" smtClean="0"/>
-              <a:t>21.02.2021</a:t>
+              <a:t>28.02.2021</a:t>
             </a:fld>
             <a:endParaRPr lang="ru-RU"/>
           </a:p>
@@ -2284,7 +2284,7 @@
           <a:p>
             <a:fld id="{B7A4174B-3865-4C52-8BB2-B1080AE4813B}" type="datetimeFigureOut">
               <a:rPr lang="ru-RU" smtClean="0"/>
-              <a:t>21.02.2021</a:t>
+              <a:t>28.02.2021</a:t>
             </a:fld>
             <a:endParaRPr lang="ru-RU"/>
           </a:p>
@@ -2561,7 +2561,7 @@
           <a:p>
             <a:fld id="{B7A4174B-3865-4C52-8BB2-B1080AE4813B}" type="datetimeFigureOut">
               <a:rPr lang="ru-RU" smtClean="0"/>
-              <a:t>21.02.2021</a:t>
+              <a:t>28.02.2021</a:t>
             </a:fld>
             <a:endParaRPr lang="ru-RU"/>
           </a:p>
@@ -2814,7 +2814,7 @@
           <a:p>
             <a:fld id="{B7A4174B-3865-4C52-8BB2-B1080AE4813B}" type="datetimeFigureOut">
               <a:rPr lang="ru-RU" smtClean="0"/>
-              <a:t>21.02.2021</a:t>
+              <a:t>28.02.2021</a:t>
             </a:fld>
             <a:endParaRPr lang="ru-RU"/>
           </a:p>
@@ -3027,7 +3027,7 @@
           <a:p>
             <a:fld id="{B7A4174B-3865-4C52-8BB2-B1080AE4813B}" type="datetimeFigureOut">
               <a:rPr lang="ru-RU" smtClean="0"/>
-              <a:t>21.02.2021</a:t>
+              <a:t>28.02.2021</a:t>
             </a:fld>
             <a:endParaRPr lang="ru-RU"/>
           </a:p>
@@ -3444,8 +3444,8 @@
         </p:nvSpPr>
         <p:spPr>
           <a:xfrm>
-            <a:off x="1524000" y="1598486"/>
-            <a:ext cx="9144000" cy="2387600"/>
+            <a:off x="1524000" y="1798654"/>
+            <a:ext cx="9144000" cy="3707843"/>
           </a:xfrm>
         </p:spPr>
         <p:txBody>
@@ -3478,7 +3478,7 @@
             </a:br>
             <a:r>
               <a:rPr lang="en-US" dirty="0" smtClean="0"/>
-              <a:t>(Draft)</a:t>
+              <a:t/>
             </a:r>
             <a:br>
               <a:rPr lang="en-US" dirty="0" smtClean="0"/>
@@ -4046,21 +4046,13 @@
           </a:bodyPr>
           <a:lstStyle/>
           <a:p>
-            <a:pPr marL="0" marR="0" lvl="0" indent="0" algn="l" defTabSz="914400" rtl="0" eaLnBrk="0" fontAlgn="base" latinLnBrk="0" hangingPunct="0">
-              <a:lnSpc>
-                <a:spcPct val="100000"/>
-              </a:lnSpc>
+            <a:pPr lvl="0" eaLnBrk="0" fontAlgn="base" hangingPunct="0">
               <a:spcBef>
                 <a:spcPct val="0"/>
               </a:spcBef>
               <a:spcAft>
                 <a:spcPct val="0"/>
               </a:spcAft>
-              <a:buClrTx/>
-              <a:buSzTx/>
-              <a:buFontTx/>
-              <a:buNone/>
-              <a:tabLst/>
             </a:pPr>
             <a:r>
               <a:rPr kumimoji="0" lang="ru-RU" altLang="ru-RU" sz="2000" b="0" i="1" u="none" strike="noStrike" cap="none" normalizeH="0" baseline="0" dirty="0" smtClean="0">
@@ -6828,7 +6820,68 @@
                 <a:latin typeface="Courier New" panose="02070309020205020404" pitchFamily="49" charset="0"/>
                 <a:cs typeface="Courier New" panose="02070309020205020404" pitchFamily="49" charset="0"/>
               </a:rPr>
-              <a:t>  }</a:t>
+              <a:t>  </a:t>
+            </a:r>
+            <a:r>
+              <a:rPr kumimoji="0" lang="ru-RU" altLang="ru-RU" b="0" i="0" u="none" strike="noStrike" cap="none" normalizeH="0" baseline="0" dirty="0" smtClean="0">
+                <a:ln>
+                  <a:noFill/>
+                </a:ln>
+                <a:effectLst/>
+                <a:latin typeface="Courier New" panose="02070309020205020404" pitchFamily="49" charset="0"/>
+                <a:cs typeface="Courier New" panose="02070309020205020404" pitchFamily="49" charset="0"/>
+              </a:rPr>
+              <a:t>}</a:t>
+            </a:r>
+            <a:r>
+              <a:rPr kumimoji="0" lang="en-US" altLang="ru-RU" b="0" i="0" u="none" strike="noStrike" cap="none" normalizeH="0" baseline="0" dirty="0" smtClean="0">
+                <a:ln>
+                  <a:noFill/>
+                </a:ln>
+                <a:effectLst/>
+                <a:latin typeface="Courier New" panose="02070309020205020404" pitchFamily="49" charset="0"/>
+                <a:cs typeface="Courier New" panose="02070309020205020404" pitchFamily="49" charset="0"/>
+              </a:rPr>
+              <a:t> //</a:t>
+            </a:r>
+            <a:r>
+              <a:rPr lang="ru-RU" altLang="ru-RU" b="1" dirty="0">
+                <a:latin typeface="Courier New" panose="02070309020205020404" pitchFamily="49" charset="0"/>
+                <a:cs typeface="Courier New" panose="02070309020205020404" pitchFamily="49" charset="0"/>
+              </a:rPr>
+              <a:t> </a:t>
+            </a:r>
+            <a:r>
+              <a:rPr lang="ru-RU" altLang="ru-RU" b="1" dirty="0" err="1" smtClean="0">
+                <a:latin typeface="Courier New" panose="02070309020205020404" pitchFamily="49" charset="0"/>
+                <a:cs typeface="Courier New" panose="02070309020205020404" pitchFamily="49" charset="0"/>
+              </a:rPr>
+              <a:t>ReliableRDDCheckpointData</a:t>
+            </a:r>
+            <a:r>
+              <a:rPr lang="en-US" altLang="ru-RU" b="1" dirty="0" smtClean="0">
+                <a:latin typeface="Courier New" panose="02070309020205020404" pitchFamily="49" charset="0"/>
+                <a:cs typeface="Courier New" panose="02070309020205020404" pitchFamily="49" charset="0"/>
+              </a:rPr>
+              <a:t> is subclass of </a:t>
+            </a:r>
+            <a:r>
+              <a:rPr lang="ru-RU" altLang="ru-RU" b="1" dirty="0" err="1">
+                <a:latin typeface="Courier New" panose="02070309020205020404" pitchFamily="49" charset="0"/>
+                <a:cs typeface="Courier New" panose="02070309020205020404" pitchFamily="49" charset="0"/>
+              </a:rPr>
+              <a:t>RDDCheckpointData</a:t>
+            </a:r>
+            <a:r>
+              <a:rPr kumimoji="0" lang="ru-RU" altLang="ru-RU" b="0" i="0" u="none" strike="noStrike" cap="none" normalizeH="0" baseline="0" dirty="0" smtClean="0">
+                <a:ln>
+                  <a:noFill/>
+                </a:ln>
+                <a:effectLst/>
+                <a:latin typeface="Courier New" panose="02070309020205020404" pitchFamily="49" charset="0"/>
+                <a:cs typeface="Courier New" panose="02070309020205020404" pitchFamily="49" charset="0"/>
+              </a:rPr>
+              <a:t/>
             </a:r>
             <a:br>
               <a:rPr kumimoji="0" lang="ru-RU" altLang="ru-RU" b="0" i="0" u="none" strike="noStrike" cap="none" normalizeH="0" baseline="0" dirty="0" smtClean="0">
@@ -9226,7 +9279,7 @@
                 <a:ea typeface="+mj-ea"/>
                 <a:cs typeface="+mj-cs"/>
               </a:rPr>
-              <a:t>Class </a:t>
+              <a:t>object </a:t>
             </a:r>
             <a:r>
               <a:rPr lang="en-US" sz="4400" dirty="0" err="1" smtClean="0">
@@ -10059,7 +10112,15 @@
             </a:r>
             <a:r>
               <a:rPr lang="en-US" sz="3600" dirty="0" smtClean="0"/>
-              <a:t> df1 =</a:t>
+              <a:t> </a:t>
+            </a:r>
+            <a:r>
+              <a:rPr lang="en-US" sz="3600" dirty="0" smtClean="0"/>
+              <a:t>ds1 </a:t>
+            </a:r>
+            <a:r>
+              <a:rPr lang="en-US" sz="3600" dirty="0" smtClean="0"/>
+              <a:t>=</a:t>
             </a:r>
             <a:r>
               <a:rPr lang="en-US" sz="3600" dirty="0" err="1" smtClean="0"/>
@@ -10080,12 +10141,20 @@
           </a:p>
           <a:p>
             <a:r>
+              <a:rPr lang="en-US" sz="3600" dirty="0" smtClean="0"/>
+              <a:t>d</a:t>
+            </a:r>
+            <a:r>
               <a:rPr lang="en-US" sz="3600" dirty="0"/>
-              <a:t>d</a:t>
+              <a:t>s</a:t>
             </a:r>
             <a:r>
               <a:rPr lang="en-US" sz="3600" dirty="0" smtClean="0"/>
-              <a:t>f1.collect()</a:t>
+              <a:t>1.collect</a:t>
+            </a:r>
+            <a:r>
+              <a:rPr lang="en-US" sz="3600" dirty="0" smtClean="0"/>
+              <a:t>()</a:t>
             </a:r>
             <a:endParaRPr lang="ru-RU" sz="3600" dirty="0"/>
           </a:p>
@@ -10254,12 +10323,16 @@
               <a:t> </a:t>
             </a:r>
             <a:r>
-              <a:rPr lang="en-US" sz="2400" dirty="0" err="1"/>
+              <a:rPr lang="en-US" sz="2400" b="1" dirty="0" err="1"/>
               <a:t>writePartitionToCheckpointFile</a:t>
             </a:r>
             <a:r>
+              <a:rPr lang="en-US" sz="2400" b="1" dirty="0"/>
+              <a:t>[T</a:t>
+            </a:r>
+            <a:r>
               <a:rPr lang="en-US" sz="2400" dirty="0"/>
-              <a:t>[T: </a:t>
+              <a:t>: </a:t>
             </a:r>
             <a:r>
               <a:rPr lang="en-US" sz="2400" dirty="0" err="1"/>
@@ -10273,7 +10346,15 @@
           <a:p>
             <a:r>
               <a:rPr lang="en-US" sz="2400" dirty="0"/>
-              <a:t>      path: String,</a:t>
+              <a:t>      </a:t>
+            </a:r>
+            <a:r>
+              <a:rPr lang="en-US" sz="2400" b="1" dirty="0"/>
+              <a:t>path</a:t>
+            </a:r>
+            <a:r>
+              <a:rPr lang="en-US" sz="2400" dirty="0"/>
+              <a:t>: String,</a:t>
             </a:r>
           </a:p>
           <a:p>
@@ -11821,18 +11902,16 @@
               <a:t> </a:t>
             </a:r>
             <a:r>
-              <a:rPr lang="en-US" sz="2400" dirty="0" err="1"/>
+              <a:rPr lang="en-US" sz="2400" b="1" dirty="0" err="1"/>
               <a:t>readCheckpointFile</a:t>
             </a:r>
             <a:r>
+              <a:rPr lang="en-US" sz="2400" b="1" dirty="0"/>
+              <a:t>[T</a:t>
+            </a:r>
+            <a:r>
               <a:rPr lang="en-US" sz="2400" dirty="0"/>
-              <a:t>[T](</a:t>
-            </a:r>
-          </a:p>
-          <a:p>
-            <a:r>
-              <a:rPr lang="en-US" sz="2400" dirty="0"/>
-              <a:t>      path: Path,</a:t>
+              <a:t>](</a:t>
             </a:r>
           </a:p>
           <a:p>
@@ -11841,6 +11920,20 @@
               <a:t>      </a:t>
             </a:r>
             <a:r>
+              <a:rPr lang="en-US" sz="2400" b="1" dirty="0"/>
+              <a:t>path</a:t>
+            </a:r>
+            <a:r>
+              <a:rPr lang="en-US" sz="2400" dirty="0"/>
+              <a:t>: Path,</a:t>
+            </a:r>
+          </a:p>
+          <a:p>
+            <a:r>
+              <a:rPr lang="en-US" sz="2400" dirty="0"/>
+              <a:t>      </a:t>
+            </a:r>
+            <a:r>
               <a:rPr lang="en-US" sz="2400" dirty="0" err="1"/>
               <a:t>broadcastedConf</a:t>
             </a:r>
@@ -11868,7 +11961,15 @@
             </a:r>
             <a:r>
               <a:rPr lang="en-US" sz="2400" dirty="0"/>
-              <a:t>): Iterator[T] = {</a:t>
+              <a:t>): </a:t>
+            </a:r>
+            <a:r>
+              <a:rPr lang="en-US" sz="2400" b="1" dirty="0"/>
+              <a:t>Iterator[T]</a:t>
+            </a:r>
+            <a:r>
+              <a:rPr lang="en-US" sz="2400" dirty="0"/>
+              <a:t> = {</a:t>
             </a:r>
           </a:p>
           <a:p>
@@ -11959,10 +12060,6 @@
             </a:r>
           </a:p>
           <a:p>
-            <a:r>
-              <a:rPr lang="en-US" sz="2400" dirty="0" smtClean="0"/>
-              <a:t>}</a:t>
-            </a:r>
             <a:endParaRPr lang="ru-RU" sz="2400" dirty="0"/>
           </a:p>
         </p:txBody>
@@ -12083,26 +12180,149 @@
               <a:t> </a:t>
             </a:r>
             <a:r>
+              <a:rPr lang="en-US" dirty="0" smtClean="0"/>
+              <a:t>  </a:t>
+            </a:r>
+            <a:r>
+              <a:rPr lang="en-US" dirty="0" err="1" smtClean="0"/>
+              <a:t>val</a:t>
+            </a:r>
+            <a:r>
+              <a:rPr lang="en-US" dirty="0" smtClean="0"/>
+              <a:t> </a:t>
+            </a:r>
+            <a:r>
+              <a:rPr lang="en-US" b="1" dirty="0" err="1"/>
+              <a:t>fileInputStream</a:t>
+            </a:r>
+            <a:r>
+              <a:rPr lang="en-US" dirty="0"/>
+              <a:t> = {</a:t>
+            </a:r>
+          </a:p>
+          <a:p>
+            <a:r>
+              <a:rPr lang="en-US" dirty="0"/>
+              <a:t>      </a:t>
+            </a:r>
+            <a:r>
               <a:rPr lang="en-US" dirty="0" err="1"/>
               <a:t>val</a:t>
             </a:r>
             <a:r>
-              <a:rPr lang="en-US" dirty="0"/>
+              <a:rPr lang="en-US" b="1" dirty="0"/>
               <a:t> </a:t>
             </a:r>
             <a:r>
+              <a:rPr lang="en-US" b="1" dirty="0" err="1"/>
+              <a:t>fileStream</a:t>
+            </a:r>
+            <a:r>
+              <a:rPr lang="en-US" b="1" dirty="0"/>
+              <a:t> = </a:t>
+            </a:r>
+            <a:r>
+              <a:rPr lang="en-US" b="1" dirty="0" err="1"/>
+              <a:t>fs.open</a:t>
+            </a:r>
+            <a:r>
+              <a:rPr lang="en-US" b="1" dirty="0"/>
+              <a:t>(path, </a:t>
+            </a:r>
+            <a:r>
+              <a:rPr lang="en-US" b="1" dirty="0" err="1"/>
+              <a:t>bufferSize</a:t>
+            </a:r>
+            <a:r>
+              <a:rPr lang="en-US" b="1" dirty="0"/>
+              <a:t>)</a:t>
+            </a:r>
+          </a:p>
+          <a:p>
+            <a:r>
+              <a:rPr lang="en-US" dirty="0"/>
+              <a:t>      if (</a:t>
+            </a:r>
+            <a:r>
               <a:rPr lang="en-US" dirty="0" err="1"/>
-              <a:t>fileInputStream</a:t>
-            </a:r>
-            <a:r>
-              <a:rPr lang="en-US" dirty="0"/>
-              <a:t> = {</a:t>
-            </a:r>
-          </a:p>
-          <a:p>
-            <a:r>
-              <a:rPr lang="en-US" dirty="0"/>
-              <a:t>      </a:t>
+              <a:t>env.conf.get</a:t>
+            </a:r>
+            <a:r>
+              <a:rPr lang="en-US" dirty="0"/>
+              <a:t>(CHECKPOINT_COMPRESS)) {</a:t>
+            </a:r>
+          </a:p>
+          <a:p>
+            <a:r>
+              <a:rPr lang="en-US" dirty="0"/>
+              <a:t>        </a:t>
+            </a:r>
+            <a:r>
+              <a:rPr lang="en-US" dirty="0" err="1"/>
+              <a:t>CompressionCodec.createCodec</a:t>
+            </a:r>
+            <a:r>
+              <a:rPr lang="en-US" dirty="0"/>
+              <a:t>(</a:t>
+            </a:r>
+            <a:r>
+              <a:rPr lang="en-US" dirty="0" err="1"/>
+              <a:t>env.conf</a:t>
+            </a:r>
+            <a:r>
+              <a:rPr lang="en-US" dirty="0"/>
+              <a:t>).</a:t>
+            </a:r>
+            <a:r>
+              <a:rPr lang="en-US" dirty="0" err="1"/>
+              <a:t>compressedInputStream</a:t>
+            </a:r>
+            <a:r>
+              <a:rPr lang="en-US" dirty="0"/>
+              <a:t>(</a:t>
+            </a:r>
+            <a:r>
+              <a:rPr lang="en-US" dirty="0" err="1"/>
+              <a:t>fileStream</a:t>
+            </a:r>
+            <a:r>
+              <a:rPr lang="en-US" dirty="0"/>
+              <a:t>)</a:t>
+            </a:r>
+          </a:p>
+          <a:p>
+            <a:r>
+              <a:rPr lang="en-US" dirty="0"/>
+              <a:t>      } else {</a:t>
+            </a:r>
+          </a:p>
+          <a:p>
+            <a:r>
+              <a:rPr lang="en-US" dirty="0"/>
+              <a:t>        </a:t>
+            </a:r>
+            <a:r>
+              <a:rPr lang="en-US" dirty="0" err="1"/>
+              <a:t>fileStream</a:t>
+            </a:r>
+            <a:endParaRPr lang="en-US" dirty="0"/>
+          </a:p>
+          <a:p>
+            <a:r>
+              <a:rPr lang="en-US" dirty="0"/>
+              <a:t>      }</a:t>
+            </a:r>
+          </a:p>
+          <a:p>
+            <a:r>
+              <a:rPr lang="en-US" dirty="0"/>
+              <a:t>    }</a:t>
+            </a:r>
+          </a:p>
+          <a:p>
+            <a:r>
+              <a:rPr lang="en-US" dirty="0"/>
+              <a:t>    </a:t>
             </a:r>
             <a:r>
               <a:rPr lang="en-US" dirty="0" err="1"/>
@@ -12114,125 +12334,6 @@
             </a:r>
             <a:r>
               <a:rPr lang="en-US" dirty="0" err="1"/>
-              <a:t>fileStream</a:t>
-            </a:r>
-            <a:r>
-              <a:rPr lang="en-US" dirty="0"/>
-              <a:t> = </a:t>
-            </a:r>
-            <a:r>
-              <a:rPr lang="en-US" dirty="0" err="1"/>
-              <a:t>fs.open</a:t>
-            </a:r>
-            <a:r>
-              <a:rPr lang="en-US" dirty="0"/>
-              <a:t>(path, </a:t>
-            </a:r>
-            <a:r>
-              <a:rPr lang="en-US" dirty="0" err="1"/>
-              <a:t>bufferSize</a:t>
-            </a:r>
-            <a:r>
-              <a:rPr lang="en-US" dirty="0"/>
-              <a:t>)</a:t>
-            </a:r>
-          </a:p>
-          <a:p>
-            <a:r>
-              <a:rPr lang="en-US" dirty="0"/>
-              <a:t>      if (</a:t>
-            </a:r>
-            <a:r>
-              <a:rPr lang="en-US" dirty="0" err="1"/>
-              <a:t>env.conf.get</a:t>
-            </a:r>
-            <a:r>
-              <a:rPr lang="en-US" dirty="0"/>
-              <a:t>(CHECKPOINT_COMPRESS)) {</a:t>
-            </a:r>
-          </a:p>
-          <a:p>
-            <a:r>
-              <a:rPr lang="en-US" dirty="0"/>
-              <a:t>        </a:t>
-            </a:r>
-            <a:r>
-              <a:rPr lang="en-US" dirty="0" err="1"/>
-              <a:t>CompressionCodec.createCodec</a:t>
-            </a:r>
-            <a:r>
-              <a:rPr lang="en-US" dirty="0"/>
-              <a:t>(</a:t>
-            </a:r>
-            <a:r>
-              <a:rPr lang="en-US" dirty="0" err="1"/>
-              <a:t>env.conf</a:t>
-            </a:r>
-            <a:r>
-              <a:rPr lang="en-US" dirty="0"/>
-              <a:t>).</a:t>
-            </a:r>
-            <a:r>
-              <a:rPr lang="en-US" dirty="0" err="1"/>
-              <a:t>compressedInputStream</a:t>
-            </a:r>
-            <a:r>
-              <a:rPr lang="en-US" dirty="0"/>
-              <a:t>(</a:t>
-            </a:r>
-            <a:r>
-              <a:rPr lang="en-US" dirty="0" err="1"/>
-              <a:t>fileStream</a:t>
-            </a:r>
-            <a:r>
-              <a:rPr lang="en-US" dirty="0"/>
-              <a:t>)</a:t>
-            </a:r>
-          </a:p>
-          <a:p>
-            <a:r>
-              <a:rPr lang="en-US" dirty="0"/>
-              <a:t>      } else {</a:t>
-            </a:r>
-          </a:p>
-          <a:p>
-            <a:r>
-              <a:rPr lang="en-US" dirty="0"/>
-              <a:t>        </a:t>
-            </a:r>
-            <a:r>
-              <a:rPr lang="en-US" dirty="0" err="1"/>
-              <a:t>fileStream</a:t>
-            </a:r>
-            <a:endParaRPr lang="en-US" dirty="0"/>
-          </a:p>
-          <a:p>
-            <a:r>
-              <a:rPr lang="en-US" dirty="0"/>
-              <a:t>      }</a:t>
-            </a:r>
-          </a:p>
-          <a:p>
-            <a:r>
-              <a:rPr lang="en-US" dirty="0"/>
-              <a:t>    }</a:t>
-            </a:r>
-          </a:p>
-          <a:p>
-            <a:r>
-              <a:rPr lang="en-US" dirty="0"/>
-              <a:t>    </a:t>
-            </a:r>
-            <a:r>
-              <a:rPr lang="en-US" dirty="0" err="1"/>
-              <a:t>val</a:t>
-            </a:r>
-            <a:r>
-              <a:rPr lang="en-US" dirty="0"/>
-              <a:t> </a:t>
-            </a:r>
-            <a:r>
-              <a:rPr lang="en-US" dirty="0" err="1"/>
               <a:t>serializer</a:t>
             </a:r>
             <a:r>
@@ -12254,35 +12355,35 @@
               <a:t>    </a:t>
             </a:r>
             <a:r>
-              <a:rPr lang="en-US" dirty="0" err="1"/>
+              <a:rPr lang="en-US" b="1" dirty="0" err="1"/>
               <a:t>val</a:t>
             </a:r>
             <a:r>
-              <a:rPr lang="en-US" dirty="0"/>
+              <a:rPr lang="en-US" b="1" dirty="0"/>
               <a:t> </a:t>
             </a:r>
             <a:r>
-              <a:rPr lang="en-US" dirty="0" err="1"/>
+              <a:rPr lang="en-US" b="1" dirty="0" err="1"/>
               <a:t>deserializeStream</a:t>
             </a:r>
             <a:r>
-              <a:rPr lang="en-US" dirty="0"/>
+              <a:rPr lang="en-US" b="1" dirty="0"/>
               <a:t> = </a:t>
             </a:r>
             <a:r>
-              <a:rPr lang="en-US" dirty="0" err="1"/>
+              <a:rPr lang="en-US" b="1" dirty="0" err="1"/>
               <a:t>serializer.deserializeStream</a:t>
             </a:r>
             <a:r>
-              <a:rPr lang="en-US" dirty="0"/>
+              <a:rPr lang="en-US" b="1" dirty="0"/>
               <a:t>(</a:t>
             </a:r>
             <a:r>
-              <a:rPr lang="en-US" dirty="0" err="1"/>
+              <a:rPr lang="en-US" b="1" dirty="0" err="1"/>
               <a:t>fileInputStream</a:t>
             </a:r>
             <a:r>
-              <a:rPr lang="en-US" dirty="0"/>
+              <a:rPr lang="en-US" b="1" dirty="0"/>
               <a:t>)</a:t>
             </a:r>
           </a:p>
@@ -12323,14 +12424,18 @@
           <a:p>
             <a:r>
               <a:rPr lang="en-US" dirty="0"/>
-              <a:t>    </a:t>
-            </a:r>
-            <a:r>
-              <a:rPr lang="en-US" dirty="0" err="1"/>
+              <a:t>   </a:t>
+            </a:r>
+            <a:r>
+              <a:rPr lang="en-US" b="1" dirty="0"/>
+              <a:t> </a:t>
+            </a:r>
+            <a:r>
+              <a:rPr lang="en-US" b="1" dirty="0" err="1"/>
               <a:t>deserializeStream.asIterator.asInstanceOf</a:t>
             </a:r>
             <a:r>
-              <a:rPr lang="en-US" dirty="0"/>
+              <a:rPr lang="en-US" b="1" dirty="0"/>
               <a:t>[Iterator[T]]</a:t>
             </a:r>
           </a:p>
@@ -12630,7 +12735,7 @@
         <p:spPr>
           <a:xfrm>
             <a:off x="793821" y="3057620"/>
-            <a:ext cx="11183814" cy="1889090"/>
+            <a:ext cx="11183814" cy="1407314"/>
           </a:xfrm>
           <a:prstGeom prst="roundRect">
             <a:avLst/>
@@ -12657,7 +12762,6 @@
           <a:bodyPr rtlCol="0" anchor="ctr"/>
           <a:lstStyle/>
           <a:p>
-            <a:pPr algn="ctr"/>
             <a:r>
               <a:rPr lang="en-US" sz="3000" dirty="0" smtClean="0">
                 <a:solidFill>
@@ -12790,7 +12894,19 @@
           <a:lstStyle/>
           <a:p>
             <a:pPr algn="ctr"/>
-            <a:endParaRPr lang="ru-RU"/>
+            <a:r>
+              <a:rPr lang="en-US" dirty="0" smtClean="0"/>
+              <a:t>Part-</a:t>
+            </a:r>
+            <a:r>
+              <a:rPr lang="ru-RU" dirty="0" smtClean="0"/>
+              <a:t>0000</a:t>
+            </a:r>
+            <a:r>
+              <a:rPr lang="en-US" dirty="0" smtClean="0"/>
+              <a:t>0</a:t>
+            </a:r>
+            <a:endParaRPr lang="ru-RU" dirty="0"/>
           </a:p>
         </p:txBody>
       </p:sp>
@@ -12830,7 +12946,19 @@
           <a:lstStyle/>
           <a:p>
             <a:pPr algn="ctr"/>
-            <a:endParaRPr lang="ru-RU"/>
+            <a:r>
+              <a:rPr lang="en-US" dirty="0" smtClean="0"/>
+              <a:t>Part-</a:t>
+            </a:r>
+            <a:r>
+              <a:rPr lang="ru-RU" dirty="0" smtClean="0"/>
+              <a:t>0000</a:t>
+            </a:r>
+            <a:r>
+              <a:rPr lang="en-US" dirty="0" smtClean="0"/>
+              <a:t>1</a:t>
+            </a:r>
+            <a:endParaRPr lang="ru-RU" dirty="0"/>
           </a:p>
         </p:txBody>
       </p:sp>
@@ -12870,7 +12998,19 @@
           <a:lstStyle/>
           <a:p>
             <a:pPr algn="ctr"/>
-            <a:endParaRPr lang="ru-RU"/>
+            <a:r>
+              <a:rPr lang="en-US" dirty="0" smtClean="0"/>
+              <a:t>Part-</a:t>
+            </a:r>
+            <a:r>
+              <a:rPr lang="ru-RU" dirty="0" smtClean="0"/>
+              <a:t>0000</a:t>
+            </a:r>
+            <a:r>
+              <a:rPr lang="en-US" dirty="0" smtClean="0"/>
+              <a:t>2</a:t>
+            </a:r>
+            <a:endParaRPr lang="ru-RU" dirty="0"/>
           </a:p>
         </p:txBody>
       </p:sp>
@@ -13288,6 +13428,185 @@
           </a:fontRef>
         </p:style>
       </p:cxnSp>
+      <p:sp>
+        <p:nvSpPr>
+          <p:cNvPr id="26" name="TextBox 25"/>
+          <p:cNvSpPr txBox="1"/>
+          <p:nvPr/>
+        </p:nvSpPr>
+        <p:spPr>
+          <a:xfrm>
+            <a:off x="1173094" y="3124588"/>
+            <a:ext cx="750590" cy="369332"/>
+          </a:xfrm>
+          <a:prstGeom prst="rect">
+            <a:avLst/>
+          </a:prstGeom>
+          <a:noFill/>
+        </p:spPr>
+        <p:txBody>
+          <a:bodyPr wrap="none" rtlCol="0">
+            <a:spAutoFit/>
+          </a:bodyPr>
+          <a:lstStyle/>
+          <a:p>
+            <a:r>
+              <a:rPr lang="en-US" dirty="0" err="1"/>
+              <a:t>r</a:t>
+            </a:r>
+            <a:r>
+              <a:rPr lang="en-US" dirty="0" err="1" smtClean="0"/>
+              <a:t>dd</a:t>
+            </a:r>
+            <a:r>
+              <a:rPr lang="en-US" dirty="0" smtClean="0"/>
+              <a:t>-id</a:t>
+            </a:r>
+            <a:endParaRPr lang="ru-RU" dirty="0"/>
+          </a:p>
+        </p:txBody>
+      </p:sp>
+      <p:sp>
+        <p:nvSpPr>
+          <p:cNvPr id="3" name="Скругленный прямоугольник 2"/>
+          <p:cNvSpPr/>
+          <p:nvPr/>
+        </p:nvSpPr>
+        <p:spPr>
+          <a:xfrm>
+            <a:off x="793821" y="4691634"/>
+            <a:ext cx="11083331" cy="1576396"/>
+          </a:xfrm>
+          <a:prstGeom prst="roundRect">
+            <a:avLst/>
+          </a:prstGeom>
+          <a:noFill/>
+        </p:spPr>
+        <p:style>
+          <a:lnRef idx="2">
+            <a:schemeClr val="accent1">
+              <a:shade val="50000"/>
+            </a:schemeClr>
+          </a:lnRef>
+          <a:fillRef idx="1">
+            <a:schemeClr val="accent1"/>
+          </a:fillRef>
+          <a:effectRef idx="0">
+            <a:schemeClr val="accent1"/>
+          </a:effectRef>
+          <a:fontRef idx="minor">
+            <a:schemeClr val="lt1"/>
+          </a:fontRef>
+        </p:style>
+        <p:txBody>
+          <a:bodyPr rtlCol="0" anchor="ctr"/>
+          <a:lstStyle/>
+          <a:p>
+            <a:pPr algn="ctr"/>
+            <a:endParaRPr lang="ru-RU"/>
+          </a:p>
+        </p:txBody>
+      </p:sp>
+      <p:sp>
+        <p:nvSpPr>
+          <p:cNvPr id="9" name="Прямоугольник 8"/>
+          <p:cNvSpPr/>
+          <p:nvPr/>
+        </p:nvSpPr>
+        <p:spPr>
+          <a:xfrm>
+            <a:off x="4933742" y="4745085"/>
+            <a:ext cx="2843230" cy="400110"/>
+          </a:xfrm>
+          <a:prstGeom prst="rect">
+            <a:avLst/>
+          </a:prstGeom>
+        </p:spPr>
+        <p:txBody>
+          <a:bodyPr wrap="square">
+            <a:spAutoFit/>
+          </a:bodyPr>
+          <a:lstStyle/>
+          <a:p>
+            <a:r>
+              <a:rPr lang="en-US" sz="2000" dirty="0" err="1"/>
+              <a:t>ReliableCheckpointRDD</a:t>
+            </a:r>
+            <a:endParaRPr lang="ru-RU" sz="2000" dirty="0"/>
+          </a:p>
+        </p:txBody>
+      </p:sp>
+      <p:sp>
+        <p:nvSpPr>
+          <p:cNvPr id="27" name="Скругленный прямоугольник 26"/>
+          <p:cNvSpPr/>
+          <p:nvPr/>
+        </p:nvSpPr>
+        <p:spPr>
+          <a:xfrm>
+            <a:off x="855787" y="1226622"/>
+            <a:ext cx="11083331" cy="1576396"/>
+          </a:xfrm>
+          <a:prstGeom prst="roundRect">
+            <a:avLst/>
+          </a:prstGeom>
+          <a:noFill/>
+        </p:spPr>
+        <p:style>
+          <a:lnRef idx="2">
+            <a:schemeClr val="accent1">
+              <a:shade val="50000"/>
+            </a:schemeClr>
+          </a:lnRef>
+          <a:fillRef idx="1">
+            <a:schemeClr val="accent1"/>
+          </a:fillRef>
+          <a:effectRef idx="0">
+            <a:schemeClr val="accent1"/>
+          </a:effectRef>
+          <a:fontRef idx="minor">
+            <a:schemeClr val="lt1"/>
+          </a:fontRef>
+        </p:style>
+        <p:txBody>
+          <a:bodyPr rtlCol="0" anchor="ctr"/>
+          <a:lstStyle/>
+          <a:p>
+            <a:pPr algn="ctr"/>
+            <a:endParaRPr lang="ru-RU"/>
+          </a:p>
+        </p:txBody>
+      </p:sp>
+      <p:sp>
+        <p:nvSpPr>
+          <p:cNvPr id="29" name="Прямоугольник 28"/>
+          <p:cNvSpPr/>
+          <p:nvPr/>
+        </p:nvSpPr>
+        <p:spPr>
+          <a:xfrm>
+            <a:off x="4955515" y="1179593"/>
+            <a:ext cx="2843230" cy="400110"/>
+          </a:xfrm>
+          <a:prstGeom prst="rect">
+            <a:avLst/>
+          </a:prstGeom>
+        </p:spPr>
+        <p:txBody>
+          <a:bodyPr wrap="square">
+            <a:spAutoFit/>
+          </a:bodyPr>
+          <a:lstStyle/>
+          <a:p>
+            <a:pPr algn="ctr"/>
+            <a:r>
+              <a:rPr lang="en-US" sz="2000" dirty="0" err="1" smtClean="0"/>
+              <a:t>OriginalRDD</a:t>
+            </a:r>
+            <a:endParaRPr lang="ru-RU" sz="2000" dirty="0"/>
+          </a:p>
+        </p:txBody>
+      </p:sp>
     </p:spTree>
     <p:extLst>
       <p:ext uri="{BB962C8B-B14F-4D97-AF65-F5344CB8AC3E}">
@@ -13384,7 +13703,9 @@
             <a:endParaRPr lang="en-US" dirty="0" smtClean="0"/>
           </a:p>
           <a:p>
-            <a:pPr lvl="1"/>
+            <a:pPr marL="457200" lvl="1" indent="0">
+              <a:buNone/>
+            </a:pPr>
             <a:r>
               <a:rPr lang="en-US" sz="2000" dirty="0"/>
               <a:t> override </a:t>
@@ -13415,7 +13736,9 @@
             </a:r>
           </a:p>
           <a:p>
-            <a:pPr lvl="1"/>
+            <a:pPr marL="457200" lvl="1" indent="0">
+              <a:buNone/>
+            </a:pPr>
             <a:r>
               <a:rPr lang="en-US" sz="2000" dirty="0"/>
               <a:t>    </a:t>
@@ -13454,7 +13777,9 @@
             </a:r>
           </a:p>
           <a:p>
-            <a:pPr lvl="1"/>
+            <a:pPr marL="457200" lvl="1" indent="0">
+              <a:buNone/>
+            </a:pPr>
             <a:r>
               <a:rPr lang="en-US" sz="2000" dirty="0"/>
               <a:t>    </a:t>
@@ -13477,7 +13802,9 @@
             </a:r>
           </a:p>
           <a:p>
-            <a:pPr lvl="1"/>
+            <a:pPr marL="457200" lvl="1" indent="0">
+              <a:buNone/>
+            </a:pPr>
             <a:r>
               <a:rPr lang="en-US" sz="2000" dirty="0"/>
               <a:t>  }</a:t>
@@ -14206,7 +14533,19 @@
           <a:lstStyle/>
           <a:p>
             <a:pPr algn="ctr"/>
-            <a:endParaRPr lang="ru-RU"/>
+            <a:r>
+              <a:rPr lang="en-US" dirty="0" smtClean="0"/>
+              <a:t>Part-</a:t>
+            </a:r>
+            <a:r>
+              <a:rPr lang="ru-RU" dirty="0" smtClean="0"/>
+              <a:t>0000</a:t>
+            </a:r>
+            <a:r>
+              <a:rPr lang="en-US" dirty="0" smtClean="0"/>
+              <a:t>0</a:t>
+            </a:r>
+            <a:endParaRPr lang="ru-RU" dirty="0"/>
           </a:p>
         </p:txBody>
       </p:sp>
@@ -14246,7 +14585,19 @@
           <a:lstStyle/>
           <a:p>
             <a:pPr algn="ctr"/>
-            <a:endParaRPr lang="ru-RU"/>
+            <a:r>
+              <a:rPr lang="en-US" dirty="0" smtClean="0"/>
+              <a:t>Part-</a:t>
+            </a:r>
+            <a:r>
+              <a:rPr lang="ru-RU" dirty="0" smtClean="0"/>
+              <a:t>0000</a:t>
+            </a:r>
+            <a:r>
+              <a:rPr lang="en-US" dirty="0" smtClean="0"/>
+              <a:t>1</a:t>
+            </a:r>
+            <a:endParaRPr lang="ru-RU" dirty="0"/>
           </a:p>
         </p:txBody>
       </p:sp>
@@ -14286,7 +14637,19 @@
           <a:lstStyle/>
           <a:p>
             <a:pPr algn="ctr"/>
-            <a:endParaRPr lang="ru-RU"/>
+            <a:r>
+              <a:rPr lang="en-US" dirty="0" smtClean="0"/>
+              <a:t>Part-</a:t>
+            </a:r>
+            <a:r>
+              <a:rPr lang="ru-RU" dirty="0" smtClean="0"/>
+              <a:t>0000</a:t>
+            </a:r>
+            <a:r>
+              <a:rPr lang="en-US" dirty="0" smtClean="0"/>
+              <a:t>2</a:t>
+            </a:r>
+            <a:endParaRPr lang="ru-RU" dirty="0"/>
           </a:p>
         </p:txBody>
       </p:sp>

</xml_diff>